<commit_message>
docs: Updated pipeline with example of tools
</commit_message>
<xml_diff>
--- a/starter/DevOpsPipeline.pptx
+++ b/starter/DevOpsPipeline.pptx
@@ -53,7 +53,7 @@
       </p:grpSpPr>
       <p:sp>
         <p:nvSpPr>
-          <p:cNvPr id="22" name="PlaceHolder 1"/>
+          <p:cNvPr id="23" name="PlaceHolder 1"/>
           <p:cNvSpPr>
             <a:spLocks noGrp="1"/>
           </p:cNvSpPr>
@@ -64,7 +64,7 @@
         <p:spPr>
           <a:xfrm>
             <a:off x="311760" y="744480"/>
-            <a:ext cx="8519760" cy="2052000"/>
+            <a:ext cx="8519400" cy="2051640"/>
           </a:xfrm>
           <a:prstGeom prst="rect">
             <a:avLst/>
@@ -84,7 +84,7 @@
       </p:sp>
       <p:sp>
         <p:nvSpPr>
-          <p:cNvPr id="23" name="PlaceHolder 2"/>
+          <p:cNvPr id="24" name="PlaceHolder 2"/>
           <p:cNvSpPr>
             <a:spLocks noGrp="1"/>
           </p:cNvSpPr>
@@ -95,7 +95,7 @@
         <p:spPr>
           <a:xfrm>
             <a:off x="457200" y="1203480"/>
-            <a:ext cx="8229240" cy="1422720"/>
+            <a:ext cx="8228880" cy="1422360"/>
           </a:xfrm>
           <a:prstGeom prst="rect">
             <a:avLst/>
@@ -114,7 +114,7 @@
       </p:sp>
       <p:sp>
         <p:nvSpPr>
-          <p:cNvPr id="24" name="PlaceHolder 3"/>
+          <p:cNvPr id="25" name="PlaceHolder 3"/>
           <p:cNvSpPr>
             <a:spLocks noGrp="1"/>
           </p:cNvSpPr>
@@ -124,8 +124,8 @@
         </p:nvSpPr>
         <p:spPr>
           <a:xfrm>
-            <a:off x="457200" y="2761920"/>
-            <a:ext cx="8229240" cy="1422720"/>
+            <a:off x="457200" y="2761200"/>
+            <a:ext cx="8228880" cy="1422360"/>
           </a:xfrm>
           <a:prstGeom prst="rect">
             <a:avLst/>
@@ -166,7 +166,7 @@
       </p:grpSpPr>
       <p:sp>
         <p:nvSpPr>
-          <p:cNvPr id="25" name="PlaceHolder 1"/>
+          <p:cNvPr id="26" name="PlaceHolder 1"/>
           <p:cNvSpPr>
             <a:spLocks noGrp="1"/>
           </p:cNvSpPr>
@@ -177,7 +177,7 @@
         <p:spPr>
           <a:xfrm>
             <a:off x="311760" y="744480"/>
-            <a:ext cx="8519760" cy="2052000"/>
+            <a:ext cx="8519400" cy="2051640"/>
           </a:xfrm>
           <a:prstGeom prst="rect">
             <a:avLst/>
@@ -197,7 +197,7 @@
       </p:sp>
       <p:sp>
         <p:nvSpPr>
-          <p:cNvPr id="26" name="PlaceHolder 2"/>
+          <p:cNvPr id="27" name="PlaceHolder 2"/>
           <p:cNvSpPr>
             <a:spLocks noGrp="1"/>
           </p:cNvSpPr>
@@ -208,7 +208,7 @@
         <p:spPr>
           <a:xfrm>
             <a:off x="457200" y="1203480"/>
-            <a:ext cx="4015800" cy="1422720"/>
+            <a:ext cx="4015440" cy="1422360"/>
           </a:xfrm>
           <a:prstGeom prst="rect">
             <a:avLst/>
@@ -227,7 +227,7 @@
       </p:sp>
       <p:sp>
         <p:nvSpPr>
-          <p:cNvPr id="27" name="PlaceHolder 3"/>
+          <p:cNvPr id="28" name="PlaceHolder 3"/>
           <p:cNvSpPr>
             <a:spLocks noGrp="1"/>
           </p:cNvSpPr>
@@ -237,8 +237,8 @@
         </p:nvSpPr>
         <p:spPr>
           <a:xfrm>
-            <a:off x="4674240" y="1203480"/>
-            <a:ext cx="4015800" cy="1422720"/>
+            <a:off x="4673880" y="1203480"/>
+            <a:ext cx="4015440" cy="1422360"/>
           </a:xfrm>
           <a:prstGeom prst="rect">
             <a:avLst/>
@@ -257,7 +257,7 @@
       </p:sp>
       <p:sp>
         <p:nvSpPr>
-          <p:cNvPr id="28" name="PlaceHolder 4"/>
+          <p:cNvPr id="29" name="PlaceHolder 4"/>
           <p:cNvSpPr>
             <a:spLocks noGrp="1"/>
           </p:cNvSpPr>
@@ -267,8 +267,8 @@
         </p:nvSpPr>
         <p:spPr>
           <a:xfrm>
-            <a:off x="457200" y="2761920"/>
-            <a:ext cx="4015800" cy="1422720"/>
+            <a:off x="457200" y="2761200"/>
+            <a:ext cx="4015440" cy="1422360"/>
           </a:xfrm>
           <a:prstGeom prst="rect">
             <a:avLst/>
@@ -287,7 +287,7 @@
       </p:sp>
       <p:sp>
         <p:nvSpPr>
-          <p:cNvPr id="29" name="PlaceHolder 5"/>
+          <p:cNvPr id="30" name="PlaceHolder 5"/>
           <p:cNvSpPr>
             <a:spLocks noGrp="1"/>
           </p:cNvSpPr>
@@ -297,8 +297,8 @@
         </p:nvSpPr>
         <p:spPr>
           <a:xfrm>
-            <a:off x="4674240" y="2761920"/>
-            <a:ext cx="4015800" cy="1422720"/>
+            <a:off x="4673880" y="2761200"/>
+            <a:ext cx="4015440" cy="1422360"/>
           </a:xfrm>
           <a:prstGeom prst="rect">
             <a:avLst/>
@@ -339,7 +339,7 @@
       </p:grpSpPr>
       <p:sp>
         <p:nvSpPr>
-          <p:cNvPr id="30" name="PlaceHolder 1"/>
+          <p:cNvPr id="31" name="PlaceHolder 1"/>
           <p:cNvSpPr>
             <a:spLocks noGrp="1"/>
           </p:cNvSpPr>
@@ -350,7 +350,7 @@
         <p:spPr>
           <a:xfrm>
             <a:off x="311760" y="744480"/>
-            <a:ext cx="8519760" cy="2052000"/>
+            <a:ext cx="8519400" cy="2051640"/>
           </a:xfrm>
           <a:prstGeom prst="rect">
             <a:avLst/>
@@ -370,7 +370,7 @@
       </p:sp>
       <p:sp>
         <p:nvSpPr>
-          <p:cNvPr id="31" name="PlaceHolder 2"/>
+          <p:cNvPr id="32" name="PlaceHolder 2"/>
           <p:cNvSpPr>
             <a:spLocks noGrp="1"/>
           </p:cNvSpPr>
@@ -381,7 +381,7 @@
         <p:spPr>
           <a:xfrm>
             <a:off x="457200" y="1203480"/>
-            <a:ext cx="2649600" cy="1422720"/>
+            <a:ext cx="2649600" cy="1422360"/>
           </a:xfrm>
           <a:prstGeom prst="rect">
             <a:avLst/>
@@ -400,7 +400,7 @@
       </p:sp>
       <p:sp>
         <p:nvSpPr>
-          <p:cNvPr id="32" name="PlaceHolder 3"/>
+          <p:cNvPr id="33" name="PlaceHolder 3"/>
           <p:cNvSpPr>
             <a:spLocks noGrp="1"/>
           </p:cNvSpPr>
@@ -411,7 +411,7 @@
         <p:spPr>
           <a:xfrm>
             <a:off x="3239640" y="1203480"/>
-            <a:ext cx="2649600" cy="1422720"/>
+            <a:ext cx="2649600" cy="1422360"/>
           </a:xfrm>
           <a:prstGeom prst="rect">
             <a:avLst/>
@@ -430,7 +430,7 @@
       </p:sp>
       <p:sp>
         <p:nvSpPr>
-          <p:cNvPr id="33" name="PlaceHolder 4"/>
+          <p:cNvPr id="34" name="PlaceHolder 4"/>
           <p:cNvSpPr>
             <a:spLocks noGrp="1"/>
           </p:cNvSpPr>
@@ -441,7 +441,7 @@
         <p:spPr>
           <a:xfrm>
             <a:off x="6022080" y="1203480"/>
-            <a:ext cx="2649600" cy="1422720"/>
+            <a:ext cx="2649600" cy="1422360"/>
           </a:xfrm>
           <a:prstGeom prst="rect">
             <a:avLst/>
@@ -460,7 +460,7 @@
       </p:sp>
       <p:sp>
         <p:nvSpPr>
-          <p:cNvPr id="34" name="PlaceHolder 5"/>
+          <p:cNvPr id="35" name="PlaceHolder 5"/>
           <p:cNvSpPr>
             <a:spLocks noGrp="1"/>
           </p:cNvSpPr>
@@ -470,8 +470,8 @@
         </p:nvSpPr>
         <p:spPr>
           <a:xfrm>
-            <a:off x="457200" y="2761920"/>
-            <a:ext cx="2649600" cy="1422720"/>
+            <a:off x="457200" y="2761200"/>
+            <a:ext cx="2649600" cy="1422360"/>
           </a:xfrm>
           <a:prstGeom prst="rect">
             <a:avLst/>
@@ -490,7 +490,7 @@
       </p:sp>
       <p:sp>
         <p:nvSpPr>
-          <p:cNvPr id="35" name="PlaceHolder 6"/>
+          <p:cNvPr id="36" name="PlaceHolder 6"/>
           <p:cNvSpPr>
             <a:spLocks noGrp="1"/>
           </p:cNvSpPr>
@@ -500,8 +500,8 @@
         </p:nvSpPr>
         <p:spPr>
           <a:xfrm>
-            <a:off x="3239640" y="2761920"/>
-            <a:ext cx="2649600" cy="1422720"/>
+            <a:off x="3239640" y="2761200"/>
+            <a:ext cx="2649600" cy="1422360"/>
           </a:xfrm>
           <a:prstGeom prst="rect">
             <a:avLst/>
@@ -520,7 +520,7 @@
       </p:sp>
       <p:sp>
         <p:nvSpPr>
-          <p:cNvPr id="36" name="PlaceHolder 7"/>
+          <p:cNvPr id="37" name="PlaceHolder 7"/>
           <p:cNvSpPr>
             <a:spLocks noGrp="1"/>
           </p:cNvSpPr>
@@ -530,8 +530,8 @@
         </p:nvSpPr>
         <p:spPr>
           <a:xfrm>
-            <a:off x="6022080" y="2761920"/>
-            <a:ext cx="2649600" cy="1422720"/>
+            <a:off x="6022080" y="2761200"/>
+            <a:ext cx="2649600" cy="1422360"/>
           </a:xfrm>
           <a:prstGeom prst="rect">
             <a:avLst/>
@@ -572,7 +572,7 @@
       </p:grpSpPr>
       <p:sp>
         <p:nvSpPr>
-          <p:cNvPr id="1" name="PlaceHolder 1"/>
+          <p:cNvPr id="2" name="PlaceHolder 1"/>
           <p:cNvSpPr>
             <a:spLocks noGrp="1"/>
           </p:cNvSpPr>
@@ -583,7 +583,7 @@
         <p:spPr>
           <a:xfrm>
             <a:off x="311760" y="744480"/>
-            <a:ext cx="8519760" cy="2052000"/>
+            <a:ext cx="8519400" cy="2051640"/>
           </a:xfrm>
           <a:prstGeom prst="rect">
             <a:avLst/>
@@ -603,7 +603,7 @@
       </p:sp>
       <p:sp>
         <p:nvSpPr>
-          <p:cNvPr id="2" name="PlaceHolder 2"/>
+          <p:cNvPr id="3" name="PlaceHolder 2"/>
           <p:cNvSpPr>
             <a:spLocks noGrp="1"/>
           </p:cNvSpPr>
@@ -614,7 +614,7 @@
         <p:spPr>
           <a:xfrm>
             <a:off x="457200" y="1203480"/>
-            <a:ext cx="8229240" cy="2982960"/>
+            <a:ext cx="8228880" cy="2982600"/>
           </a:xfrm>
           <a:prstGeom prst="rect">
             <a:avLst/>
@@ -656,7 +656,7 @@
       </p:grpSpPr>
       <p:sp>
         <p:nvSpPr>
-          <p:cNvPr id="3" name="PlaceHolder 1"/>
+          <p:cNvPr id="4" name="PlaceHolder 1"/>
           <p:cNvSpPr>
             <a:spLocks noGrp="1"/>
           </p:cNvSpPr>
@@ -667,7 +667,7 @@
         <p:spPr>
           <a:xfrm>
             <a:off x="311760" y="744480"/>
-            <a:ext cx="8519760" cy="2052000"/>
+            <a:ext cx="8519400" cy="2051640"/>
           </a:xfrm>
           <a:prstGeom prst="rect">
             <a:avLst/>
@@ -687,7 +687,7 @@
       </p:sp>
       <p:sp>
         <p:nvSpPr>
-          <p:cNvPr id="4" name="PlaceHolder 2"/>
+          <p:cNvPr id="5" name="PlaceHolder 2"/>
           <p:cNvSpPr>
             <a:spLocks noGrp="1"/>
           </p:cNvSpPr>
@@ -698,7 +698,7 @@
         <p:spPr>
           <a:xfrm>
             <a:off x="457200" y="1203480"/>
-            <a:ext cx="8229240" cy="2982960"/>
+            <a:ext cx="8228880" cy="2982600"/>
           </a:xfrm>
           <a:prstGeom prst="rect">
             <a:avLst/>
@@ -739,7 +739,7 @@
       </p:grpSpPr>
       <p:sp>
         <p:nvSpPr>
-          <p:cNvPr id="5" name="PlaceHolder 1"/>
+          <p:cNvPr id="6" name="PlaceHolder 1"/>
           <p:cNvSpPr>
             <a:spLocks noGrp="1"/>
           </p:cNvSpPr>
@@ -750,7 +750,7 @@
         <p:spPr>
           <a:xfrm>
             <a:off x="311760" y="744480"/>
-            <a:ext cx="8519760" cy="2052000"/>
+            <a:ext cx="8519400" cy="2051640"/>
           </a:xfrm>
           <a:prstGeom prst="rect">
             <a:avLst/>
@@ -770,7 +770,7 @@
       </p:sp>
       <p:sp>
         <p:nvSpPr>
-          <p:cNvPr id="6" name="PlaceHolder 2"/>
+          <p:cNvPr id="7" name="PlaceHolder 2"/>
           <p:cNvSpPr>
             <a:spLocks noGrp="1"/>
           </p:cNvSpPr>
@@ -781,7 +781,7 @@
         <p:spPr>
           <a:xfrm>
             <a:off x="457200" y="1203480"/>
-            <a:ext cx="4015800" cy="2982960"/>
+            <a:ext cx="4015440" cy="2982600"/>
           </a:xfrm>
           <a:prstGeom prst="rect">
             <a:avLst/>
@@ -800,7 +800,7 @@
       </p:sp>
       <p:sp>
         <p:nvSpPr>
-          <p:cNvPr id="7" name="PlaceHolder 3"/>
+          <p:cNvPr id="8" name="PlaceHolder 3"/>
           <p:cNvSpPr>
             <a:spLocks noGrp="1"/>
           </p:cNvSpPr>
@@ -810,8 +810,8 @@
         </p:nvSpPr>
         <p:spPr>
           <a:xfrm>
-            <a:off x="4674240" y="1203480"/>
-            <a:ext cx="4015800" cy="2982960"/>
+            <a:off x="4673880" y="1203480"/>
+            <a:ext cx="4015440" cy="2982600"/>
           </a:xfrm>
           <a:prstGeom prst="rect">
             <a:avLst/>
@@ -852,7 +852,7 @@
       </p:grpSpPr>
       <p:sp>
         <p:nvSpPr>
-          <p:cNvPr id="8" name="PlaceHolder 1"/>
+          <p:cNvPr id="9" name="PlaceHolder 1"/>
           <p:cNvSpPr>
             <a:spLocks noGrp="1"/>
           </p:cNvSpPr>
@@ -863,7 +863,7 @@
         <p:spPr>
           <a:xfrm>
             <a:off x="311760" y="744480"/>
-            <a:ext cx="8519760" cy="2052000"/>
+            <a:ext cx="8519400" cy="2051640"/>
           </a:xfrm>
           <a:prstGeom prst="rect">
             <a:avLst/>
@@ -905,7 +905,7 @@
       </p:grpSpPr>
       <p:sp>
         <p:nvSpPr>
-          <p:cNvPr id="9" name="PlaceHolder 1"/>
+          <p:cNvPr id="10" name="PlaceHolder 1"/>
           <p:cNvSpPr>
             <a:spLocks noGrp="1"/>
           </p:cNvSpPr>
@@ -916,7 +916,7 @@
         <p:spPr>
           <a:xfrm>
             <a:off x="311760" y="744480"/>
-            <a:ext cx="8519760" cy="9513000"/>
+            <a:ext cx="8519400" cy="9511560"/>
           </a:xfrm>
           <a:prstGeom prst="rect">
             <a:avLst/>
@@ -958,7 +958,7 @@
       </p:grpSpPr>
       <p:sp>
         <p:nvSpPr>
-          <p:cNvPr id="10" name="PlaceHolder 1"/>
+          <p:cNvPr id="11" name="PlaceHolder 1"/>
           <p:cNvSpPr>
             <a:spLocks noGrp="1"/>
           </p:cNvSpPr>
@@ -969,7 +969,7 @@
         <p:spPr>
           <a:xfrm>
             <a:off x="311760" y="744480"/>
-            <a:ext cx="8519760" cy="2052000"/>
+            <a:ext cx="8519400" cy="2051640"/>
           </a:xfrm>
           <a:prstGeom prst="rect">
             <a:avLst/>
@@ -989,7 +989,7 @@
       </p:sp>
       <p:sp>
         <p:nvSpPr>
-          <p:cNvPr id="11" name="PlaceHolder 2"/>
+          <p:cNvPr id="12" name="PlaceHolder 2"/>
           <p:cNvSpPr>
             <a:spLocks noGrp="1"/>
           </p:cNvSpPr>
@@ -1000,7 +1000,7 @@
         <p:spPr>
           <a:xfrm>
             <a:off x="457200" y="1203480"/>
-            <a:ext cx="4015800" cy="1422720"/>
+            <a:ext cx="4015440" cy="1422360"/>
           </a:xfrm>
           <a:prstGeom prst="rect">
             <a:avLst/>
@@ -1019,7 +1019,7 @@
       </p:sp>
       <p:sp>
         <p:nvSpPr>
-          <p:cNvPr id="12" name="PlaceHolder 3"/>
+          <p:cNvPr id="13" name="PlaceHolder 3"/>
           <p:cNvSpPr>
             <a:spLocks noGrp="1"/>
           </p:cNvSpPr>
@@ -1029,8 +1029,8 @@
         </p:nvSpPr>
         <p:spPr>
           <a:xfrm>
-            <a:off x="4674240" y="1203480"/>
-            <a:ext cx="4015800" cy="2982960"/>
+            <a:off x="4673880" y="1203480"/>
+            <a:ext cx="4015440" cy="2982600"/>
           </a:xfrm>
           <a:prstGeom prst="rect">
             <a:avLst/>
@@ -1049,7 +1049,7 @@
       </p:sp>
       <p:sp>
         <p:nvSpPr>
-          <p:cNvPr id="13" name="PlaceHolder 4"/>
+          <p:cNvPr id="14" name="PlaceHolder 4"/>
           <p:cNvSpPr>
             <a:spLocks noGrp="1"/>
           </p:cNvSpPr>
@@ -1059,8 +1059,8 @@
         </p:nvSpPr>
         <p:spPr>
           <a:xfrm>
-            <a:off x="457200" y="2761920"/>
-            <a:ext cx="4015800" cy="1422720"/>
+            <a:off x="457200" y="2761200"/>
+            <a:ext cx="4015440" cy="1422360"/>
           </a:xfrm>
           <a:prstGeom prst="rect">
             <a:avLst/>
@@ -1101,7 +1101,7 @@
       </p:grpSpPr>
       <p:sp>
         <p:nvSpPr>
-          <p:cNvPr id="14" name="PlaceHolder 1"/>
+          <p:cNvPr id="15" name="PlaceHolder 1"/>
           <p:cNvSpPr>
             <a:spLocks noGrp="1"/>
           </p:cNvSpPr>
@@ -1112,7 +1112,7 @@
         <p:spPr>
           <a:xfrm>
             <a:off x="311760" y="744480"/>
-            <a:ext cx="8519760" cy="2052000"/>
+            <a:ext cx="8519400" cy="2051640"/>
           </a:xfrm>
           <a:prstGeom prst="rect">
             <a:avLst/>
@@ -1132,7 +1132,7 @@
       </p:sp>
       <p:sp>
         <p:nvSpPr>
-          <p:cNvPr id="15" name="PlaceHolder 2"/>
+          <p:cNvPr id="16" name="PlaceHolder 2"/>
           <p:cNvSpPr>
             <a:spLocks noGrp="1"/>
           </p:cNvSpPr>
@@ -1143,7 +1143,7 @@
         <p:spPr>
           <a:xfrm>
             <a:off x="457200" y="1203480"/>
-            <a:ext cx="4015800" cy="2982960"/>
+            <a:ext cx="4015440" cy="2982600"/>
           </a:xfrm>
           <a:prstGeom prst="rect">
             <a:avLst/>
@@ -1162,7 +1162,7 @@
       </p:sp>
       <p:sp>
         <p:nvSpPr>
-          <p:cNvPr id="16" name="PlaceHolder 3"/>
+          <p:cNvPr id="17" name="PlaceHolder 3"/>
           <p:cNvSpPr>
             <a:spLocks noGrp="1"/>
           </p:cNvSpPr>
@@ -1172,8 +1172,8 @@
         </p:nvSpPr>
         <p:spPr>
           <a:xfrm>
-            <a:off x="4674240" y="1203480"/>
-            <a:ext cx="4015800" cy="1422720"/>
+            <a:off x="4673880" y="1203480"/>
+            <a:ext cx="4015440" cy="1422360"/>
           </a:xfrm>
           <a:prstGeom prst="rect">
             <a:avLst/>
@@ -1192,7 +1192,7 @@
       </p:sp>
       <p:sp>
         <p:nvSpPr>
-          <p:cNvPr id="17" name="PlaceHolder 4"/>
+          <p:cNvPr id="18" name="PlaceHolder 4"/>
           <p:cNvSpPr>
             <a:spLocks noGrp="1"/>
           </p:cNvSpPr>
@@ -1202,8 +1202,8 @@
         </p:nvSpPr>
         <p:spPr>
           <a:xfrm>
-            <a:off x="4674240" y="2761920"/>
-            <a:ext cx="4015800" cy="1422720"/>
+            <a:off x="4673880" y="2761200"/>
+            <a:ext cx="4015440" cy="1422360"/>
           </a:xfrm>
           <a:prstGeom prst="rect">
             <a:avLst/>
@@ -1244,7 +1244,7 @@
       </p:grpSpPr>
       <p:sp>
         <p:nvSpPr>
-          <p:cNvPr id="18" name="PlaceHolder 1"/>
+          <p:cNvPr id="19" name="PlaceHolder 1"/>
           <p:cNvSpPr>
             <a:spLocks noGrp="1"/>
           </p:cNvSpPr>
@@ -1255,7 +1255,7 @@
         <p:spPr>
           <a:xfrm>
             <a:off x="311760" y="744480"/>
-            <a:ext cx="8519760" cy="2052000"/>
+            <a:ext cx="8519400" cy="2051640"/>
           </a:xfrm>
           <a:prstGeom prst="rect">
             <a:avLst/>
@@ -1275,7 +1275,7 @@
       </p:sp>
       <p:sp>
         <p:nvSpPr>
-          <p:cNvPr id="19" name="PlaceHolder 2"/>
+          <p:cNvPr id="20" name="PlaceHolder 2"/>
           <p:cNvSpPr>
             <a:spLocks noGrp="1"/>
           </p:cNvSpPr>
@@ -1286,7 +1286,7 @@
         <p:spPr>
           <a:xfrm>
             <a:off x="457200" y="1203480"/>
-            <a:ext cx="4015800" cy="1422720"/>
+            <a:ext cx="4015440" cy="1422360"/>
           </a:xfrm>
           <a:prstGeom prst="rect">
             <a:avLst/>
@@ -1305,7 +1305,7 @@
       </p:sp>
       <p:sp>
         <p:nvSpPr>
-          <p:cNvPr id="20" name="PlaceHolder 3"/>
+          <p:cNvPr id="21" name="PlaceHolder 3"/>
           <p:cNvSpPr>
             <a:spLocks noGrp="1"/>
           </p:cNvSpPr>
@@ -1315,8 +1315,8 @@
         </p:nvSpPr>
         <p:spPr>
           <a:xfrm>
-            <a:off x="4674240" y="1203480"/>
-            <a:ext cx="4015800" cy="1422720"/>
+            <a:off x="4673880" y="1203480"/>
+            <a:ext cx="4015440" cy="1422360"/>
           </a:xfrm>
           <a:prstGeom prst="rect">
             <a:avLst/>
@@ -1335,7 +1335,7 @@
       </p:sp>
       <p:sp>
         <p:nvSpPr>
-          <p:cNvPr id="21" name="PlaceHolder 4"/>
+          <p:cNvPr id="22" name="PlaceHolder 4"/>
           <p:cNvSpPr>
             <a:spLocks noGrp="1"/>
           </p:cNvSpPr>
@@ -1345,8 +1345,8 @@
         </p:nvSpPr>
         <p:spPr>
           <a:xfrm>
-            <a:off x="457200" y="2761920"/>
-            <a:ext cx="8229240" cy="1422720"/>
+            <a:off x="457200" y="2761200"/>
+            <a:ext cx="8228880" cy="1422360"/>
           </a:xfrm>
           <a:prstGeom prst="rect">
             <a:avLst/>
@@ -1405,7 +1405,7 @@
         <p:spPr>
           <a:xfrm>
             <a:off x="311760" y="744480"/>
-            <a:ext cx="8519760" cy="2052000"/>
+            <a:ext cx="8519400" cy="2051640"/>
           </a:xfrm>
           <a:prstGeom prst="rect">
             <a:avLst/>
@@ -1422,6 +1422,185 @@
                 <a:latin typeface="Arial"/>
               </a:rPr>
               <a:t>Click to edit the title text format</a:t>
+            </a:r>
+            <a:endParaRPr b="0" lang="en-US" sz="1800" spc="-1" strike="noStrike">
+              <a:latin typeface="Arial"/>
+            </a:endParaRPr>
+          </a:p>
+        </p:txBody>
+      </p:sp>
+      <p:sp>
+        <p:nvSpPr>
+          <p:cNvPr id="1" name="PlaceHolder 2"/>
+          <p:cNvSpPr>
+            <a:spLocks noGrp="1"/>
+          </p:cNvSpPr>
+          <p:nvPr>
+            <p:ph type="body"/>
+          </p:nvPr>
+        </p:nvSpPr>
+        <p:spPr>
+          <a:xfrm>
+            <a:off x="457200" y="1203480"/>
+            <a:ext cx="8228880" cy="2982600"/>
+          </a:xfrm>
+          <a:prstGeom prst="rect">
+            <a:avLst/>
+          </a:prstGeom>
+        </p:spPr>
+        <p:txBody>
+          <a:bodyPr lIns="0" rIns="0" tIns="0" bIns="0">
+            <a:normAutofit/>
+          </a:bodyPr>
+          <a:p>
+            <a:pPr marL="432000" indent="-324000" algn="ctr">
+              <a:spcBef>
+                <a:spcPts val="1417"/>
+              </a:spcBef>
+              <a:buClr>
+                <a:srgbClr val="000000"/>
+              </a:buClr>
+              <a:buSzPct val="45000"/>
+              <a:buFont typeface="Wingdings" charset="2"/>
+              <a:buChar char=""/>
+            </a:pPr>
+            <a:r>
+              <a:rPr b="0" lang="en-US" sz="1800" spc="-1" strike="noStrike">
+                <a:latin typeface="Arial"/>
+              </a:rPr>
+              <a:t>Click to edit the outline text format</a:t>
+            </a:r>
+            <a:endParaRPr b="0" lang="en-US" sz="1800" spc="-1" strike="noStrike">
+              <a:latin typeface="Arial"/>
+            </a:endParaRPr>
+          </a:p>
+          <a:p>
+            <a:pPr lvl="1" marL="864000" indent="-324000" algn="ctr">
+              <a:spcBef>
+                <a:spcPts val="1134"/>
+              </a:spcBef>
+              <a:buClr>
+                <a:srgbClr val="000000"/>
+              </a:buClr>
+              <a:buSzPct val="75000"/>
+              <a:buFont typeface="Symbol" charset="2"/>
+              <a:buChar char=""/>
+            </a:pPr>
+            <a:r>
+              <a:rPr b="0" lang="en-US" sz="1800" spc="-1" strike="noStrike">
+                <a:latin typeface="Arial"/>
+              </a:rPr>
+              <a:t>Second Outline Level</a:t>
+            </a:r>
+            <a:endParaRPr b="0" lang="en-US" sz="1800" spc="-1" strike="noStrike">
+              <a:latin typeface="Arial"/>
+            </a:endParaRPr>
+          </a:p>
+          <a:p>
+            <a:pPr lvl="2" marL="1296000" indent="-288000" algn="ctr">
+              <a:spcBef>
+                <a:spcPts val="850"/>
+              </a:spcBef>
+              <a:buClr>
+                <a:srgbClr val="000000"/>
+              </a:buClr>
+              <a:buSzPct val="45000"/>
+              <a:buFont typeface="Wingdings" charset="2"/>
+              <a:buChar char=""/>
+            </a:pPr>
+            <a:r>
+              <a:rPr b="0" lang="en-US" sz="1800" spc="-1" strike="noStrike">
+                <a:latin typeface="Arial"/>
+              </a:rPr>
+              <a:t>Third Outline Level</a:t>
+            </a:r>
+            <a:endParaRPr b="0" lang="en-US" sz="1800" spc="-1" strike="noStrike">
+              <a:latin typeface="Arial"/>
+            </a:endParaRPr>
+          </a:p>
+          <a:p>
+            <a:pPr lvl="3" marL="1728000" indent="-216000" algn="ctr">
+              <a:spcBef>
+                <a:spcPts val="567"/>
+              </a:spcBef>
+              <a:buClr>
+                <a:srgbClr val="000000"/>
+              </a:buClr>
+              <a:buSzPct val="75000"/>
+              <a:buFont typeface="Symbol" charset="2"/>
+              <a:buChar char=""/>
+            </a:pPr>
+            <a:r>
+              <a:rPr b="0" lang="en-US" sz="1800" spc="-1" strike="noStrike">
+                <a:latin typeface="Arial"/>
+              </a:rPr>
+              <a:t>Fourth Outline Level</a:t>
+            </a:r>
+            <a:endParaRPr b="0" lang="en-US" sz="1800" spc="-1" strike="noStrike">
+              <a:latin typeface="Arial"/>
+            </a:endParaRPr>
+          </a:p>
+          <a:p>
+            <a:pPr lvl="4" marL="2160000" indent="-216000" algn="ctr">
+              <a:spcBef>
+                <a:spcPts val="283"/>
+              </a:spcBef>
+              <a:buClr>
+                <a:srgbClr val="000000"/>
+              </a:buClr>
+              <a:buSzPct val="45000"/>
+              <a:buFont typeface="Wingdings" charset="2"/>
+              <a:buChar char=""/>
+            </a:pPr>
+            <a:r>
+              <a:rPr b="0" lang="en-US" sz="1800" spc="-1" strike="noStrike">
+                <a:latin typeface="Arial"/>
+              </a:rPr>
+              <a:t>Fifth Outline Level</a:t>
+            </a:r>
+            <a:endParaRPr b="0" lang="en-US" sz="1800" spc="-1" strike="noStrike">
+              <a:latin typeface="Arial"/>
+            </a:endParaRPr>
+          </a:p>
+          <a:p>
+            <a:pPr lvl="5" marL="2592000" indent="-216000" algn="ctr">
+              <a:spcBef>
+                <a:spcPts val="283"/>
+              </a:spcBef>
+              <a:buClr>
+                <a:srgbClr val="000000"/>
+              </a:buClr>
+              <a:buSzPct val="45000"/>
+              <a:buFont typeface="Wingdings" charset="2"/>
+              <a:buChar char=""/>
+            </a:pPr>
+            <a:r>
+              <a:rPr b="0" lang="en-US" sz="1800" spc="-1" strike="noStrike">
+                <a:latin typeface="Arial"/>
+              </a:rPr>
+              <a:t>Sixth Outline Level</a:t>
+            </a:r>
+            <a:endParaRPr b="0" lang="en-US" sz="1800" spc="-1" strike="noStrike">
+              <a:latin typeface="Arial"/>
+            </a:endParaRPr>
+          </a:p>
+          <a:p>
+            <a:pPr lvl="6" marL="3024000" indent="-216000" algn="ctr">
+              <a:spcBef>
+                <a:spcPts val="283"/>
+              </a:spcBef>
+              <a:buClr>
+                <a:srgbClr val="000000"/>
+              </a:buClr>
+              <a:buSzPct val="45000"/>
+              <a:buFont typeface="Wingdings" charset="2"/>
+              <a:buChar char=""/>
+            </a:pPr>
+            <a:r>
+              <a:rPr b="0" lang="en-US" sz="1800" spc="-1" strike="noStrike">
+                <a:latin typeface="Arial"/>
+              </a:rPr>
+              <a:t>Seventh Outline Level</a:t>
             </a:r>
             <a:endParaRPr b="0" lang="en-US" sz="1800" spc="-1" strike="noStrike">
               <a:latin typeface="Arial"/>
@@ -1468,14 +1647,14 @@
       </p:grpSpPr>
       <p:sp>
         <p:nvSpPr>
-          <p:cNvPr id="37" name="CustomShape 1"/>
+          <p:cNvPr id="38" name="CustomShape 1"/>
           <p:cNvSpPr/>
           <p:nvPr/>
         </p:nvSpPr>
         <p:spPr>
           <a:xfrm>
             <a:off x="2441520" y="2111400"/>
-            <a:ext cx="1307160" cy="596880"/>
+            <a:ext cx="1306800" cy="596520"/>
           </a:xfrm>
           <a:prstGeom prst="rect">
             <a:avLst/>
@@ -1521,14 +1700,14 @@
       </p:sp>
       <p:sp>
         <p:nvSpPr>
-          <p:cNvPr id="38" name="CustomShape 2"/>
+          <p:cNvPr id="39" name="CustomShape 2"/>
           <p:cNvSpPr/>
           <p:nvPr/>
         </p:nvSpPr>
         <p:spPr>
           <a:xfrm>
             <a:off x="6805080" y="2111400"/>
-            <a:ext cx="1665720" cy="596880"/>
+            <a:ext cx="1665360" cy="596520"/>
           </a:xfrm>
           <a:prstGeom prst="rect">
             <a:avLst/>
@@ -1574,14 +1753,14 @@
       </p:sp>
       <p:sp>
         <p:nvSpPr>
-          <p:cNvPr id="39" name="CustomShape 3"/>
+          <p:cNvPr id="40" name="CustomShape 3"/>
           <p:cNvSpPr/>
           <p:nvPr/>
         </p:nvSpPr>
         <p:spPr>
           <a:xfrm>
             <a:off x="4623120" y="2111400"/>
-            <a:ext cx="1307160" cy="596880"/>
+            <a:ext cx="1306800" cy="596520"/>
           </a:xfrm>
           <a:prstGeom prst="rect">
             <a:avLst/>
@@ -1627,14 +1806,14 @@
       </p:sp>
       <p:sp>
         <p:nvSpPr>
-          <p:cNvPr id="40" name="CustomShape 4"/>
+          <p:cNvPr id="41" name="CustomShape 4"/>
           <p:cNvSpPr/>
           <p:nvPr/>
         </p:nvSpPr>
         <p:spPr>
           <a:xfrm>
             <a:off x="182880" y="457200"/>
-            <a:ext cx="1307160" cy="596880"/>
+            <a:ext cx="1306800" cy="596520"/>
           </a:xfrm>
           <a:prstGeom prst="rect">
             <a:avLst/>
@@ -1680,14 +1859,14 @@
       </p:sp>
       <p:sp>
         <p:nvSpPr>
-          <p:cNvPr id="41" name="CustomShape 5"/>
+          <p:cNvPr id="42" name="CustomShape 5"/>
           <p:cNvSpPr/>
           <p:nvPr/>
         </p:nvSpPr>
         <p:spPr>
           <a:xfrm>
             <a:off x="338400" y="3474720"/>
-            <a:ext cx="1307160" cy="596880"/>
+            <a:ext cx="1306800" cy="596520"/>
           </a:xfrm>
           <a:prstGeom prst="rect">
             <a:avLst/>
@@ -1733,14 +1912,14 @@
       </p:sp>
       <p:sp>
         <p:nvSpPr>
-          <p:cNvPr id="42" name="CustomShape 6"/>
+          <p:cNvPr id="43" name="CustomShape 6"/>
           <p:cNvSpPr/>
           <p:nvPr/>
         </p:nvSpPr>
         <p:spPr>
           <a:xfrm>
             <a:off x="1463040" y="731520"/>
-            <a:ext cx="1631520" cy="1379160"/>
+            <a:ext cx="1631160" cy="1378800"/>
           </a:xfrm>
           <a:prstGeom prst="bentConnector2">
             <a:avLst/>
@@ -1763,14 +1942,14 @@
       </p:sp>
       <p:sp>
         <p:nvSpPr>
-          <p:cNvPr id="43" name="CustomShape 7"/>
+          <p:cNvPr id="44" name="CustomShape 7"/>
           <p:cNvSpPr/>
           <p:nvPr/>
         </p:nvSpPr>
         <p:spPr>
           <a:xfrm flipH="1" rot="10800000">
-            <a:off x="1645920" y="2709720"/>
-            <a:ext cx="3630960" cy="1130760"/>
+            <a:off x="1645560" y="2710080"/>
+            <a:ext cx="3630600" cy="1130400"/>
           </a:xfrm>
           <a:prstGeom prst="bentConnector2">
             <a:avLst/>
@@ -1793,14 +1972,14 @@
       </p:sp>
       <p:sp>
         <p:nvSpPr>
-          <p:cNvPr id="44" name="CustomShape 8"/>
+          <p:cNvPr id="45" name="CustomShape 8"/>
           <p:cNvSpPr/>
           <p:nvPr/>
         </p:nvSpPr>
         <p:spPr>
           <a:xfrm>
             <a:off x="3749400" y="2410200"/>
-            <a:ext cx="873360" cy="360"/>
+            <a:ext cx="873000" cy="360"/>
           </a:xfrm>
           <a:prstGeom prst="bentConnector3">
             <a:avLst>
@@ -1825,14 +2004,14 @@
       </p:sp>
       <p:sp>
         <p:nvSpPr>
-          <p:cNvPr id="45" name="CustomShape 9"/>
+          <p:cNvPr id="46" name="CustomShape 9"/>
           <p:cNvSpPr/>
           <p:nvPr/>
         </p:nvSpPr>
         <p:spPr>
           <a:xfrm>
             <a:off x="5931360" y="2410200"/>
-            <a:ext cx="873360" cy="360"/>
+            <a:ext cx="873000" cy="360"/>
           </a:xfrm>
           <a:prstGeom prst="bentConnector3">
             <a:avLst>
@@ -1857,14 +2036,14 @@
       </p:sp>
       <p:sp>
         <p:nvSpPr>
-          <p:cNvPr id="46" name="CustomShape 10"/>
+          <p:cNvPr id="47" name="CustomShape 10"/>
           <p:cNvSpPr/>
           <p:nvPr/>
         </p:nvSpPr>
         <p:spPr>
           <a:xfrm>
             <a:off x="2286000" y="3474720"/>
-            <a:ext cx="1737000" cy="639720"/>
+            <a:ext cx="1736640" cy="639360"/>
           </a:xfrm>
           <a:prstGeom prst="rect">
             <a:avLst/>
@@ -1922,24 +2101,44 @@
                 <a:latin typeface="Arial"/>
                 <a:ea typeface="DejaVu Sans"/>
               </a:rPr>
-              <a:t>compliance scanning.</a:t>
+              <a:t>compliance scanning - </a:t>
             </a:r>
             <a:endParaRPr b="0" lang="en-US" sz="1050" spc="-1" strike="noStrike">
               <a:latin typeface="Arial"/>
             </a:endParaRPr>
           </a:p>
-        </p:txBody>
-      </p:sp>
-      <p:sp>
-        <p:nvSpPr>
-          <p:cNvPr id="47" name="CustomShape 11"/>
+          <a:p>
+            <a:pPr algn="ctr">
+              <a:lnSpc>
+                <a:spcPct val="100000"/>
+              </a:lnSpc>
+            </a:pPr>
+            <a:r>
+              <a:rPr b="0" lang="en-US" sz="1050" spc="-1" strike="noStrike">
+                <a:solidFill>
+                  <a:srgbClr val="000000"/>
+                </a:solidFill>
+                <a:latin typeface="Arial"/>
+                <a:ea typeface="DejaVu Sans"/>
+              </a:rPr>
+              <a:t>Checkov</a:t>
+            </a:r>
+            <a:endParaRPr b="0" lang="en-US" sz="1050" spc="-1" strike="noStrike">
+              <a:latin typeface="Arial"/>
+            </a:endParaRPr>
+          </a:p>
+        </p:txBody>
+      </p:sp>
+      <p:sp>
+        <p:nvSpPr>
+          <p:cNvPr id="48" name="CustomShape 11"/>
           <p:cNvSpPr/>
           <p:nvPr/>
         </p:nvSpPr>
         <p:spPr>
           <a:xfrm>
             <a:off x="1920240" y="457200"/>
-            <a:ext cx="1737000" cy="639720"/>
+            <a:ext cx="1736640" cy="639360"/>
           </a:xfrm>
           <a:prstGeom prst="rect">
             <a:avLst/>
@@ -2007,24 +2206,44 @@
                 <a:latin typeface="Arial"/>
                 <a:ea typeface="DejaVu Sans"/>
               </a:rPr>
-              <a:t>image scanning</a:t>
+              <a:t>image scanning -</a:t>
             </a:r>
             <a:endParaRPr b="0" lang="en-US" sz="1050" spc="-1" strike="noStrike">
               <a:latin typeface="Arial"/>
             </a:endParaRPr>
           </a:p>
-        </p:txBody>
-      </p:sp>
-      <p:sp>
-        <p:nvSpPr>
-          <p:cNvPr id="48" name="CustomShape 12"/>
+          <a:p>
+            <a:pPr algn="ctr">
+              <a:lnSpc>
+                <a:spcPct val="100000"/>
+              </a:lnSpc>
+            </a:pPr>
+            <a:r>
+              <a:rPr b="0" lang="en-US" sz="1050" spc="-1" strike="noStrike">
+                <a:solidFill>
+                  <a:srgbClr val="000000"/>
+                </a:solidFill>
+                <a:latin typeface="Arial"/>
+                <a:ea typeface="DejaVu Sans"/>
+              </a:rPr>
+              <a:t>Anchore </a:t>
+            </a:r>
+            <a:endParaRPr b="0" lang="en-US" sz="1050" spc="-1" strike="noStrike">
+              <a:latin typeface="Arial"/>
+            </a:endParaRPr>
+          </a:p>
+        </p:txBody>
+      </p:sp>
+      <p:sp>
+        <p:nvSpPr>
+          <p:cNvPr id="49" name="CustomShape 12"/>
           <p:cNvSpPr/>
           <p:nvPr/>
         </p:nvSpPr>
         <p:spPr>
           <a:xfrm>
             <a:off x="6858360" y="3383280"/>
-            <a:ext cx="1737000" cy="639720"/>
+            <a:ext cx="1736640" cy="639360"/>
           </a:xfrm>
           <a:prstGeom prst="rect">
             <a:avLst/>
@@ -2082,24 +2301,44 @@
                 <a:latin typeface="Arial"/>
                 <a:ea typeface="DejaVu Sans"/>
               </a:rPr>
-              <a:t>compliance scanning.</a:t>
+              <a:t>compliance scanning -</a:t>
             </a:r>
             <a:endParaRPr b="0" lang="en-US" sz="1050" spc="-1" strike="noStrike">
               <a:latin typeface="Arial"/>
             </a:endParaRPr>
           </a:p>
-        </p:txBody>
-      </p:sp>
-      <p:sp>
-        <p:nvSpPr>
-          <p:cNvPr id="49" name="CustomShape 13"/>
+          <a:p>
+            <a:pPr algn="ctr">
+              <a:lnSpc>
+                <a:spcPct val="100000"/>
+              </a:lnSpc>
+            </a:pPr>
+            <a:r>
+              <a:rPr b="0" lang="en-US" sz="1050" spc="-1" strike="noStrike">
+                <a:solidFill>
+                  <a:srgbClr val="000000"/>
+                </a:solidFill>
+                <a:latin typeface="Arial"/>
+                <a:ea typeface="DejaVu Sans"/>
+              </a:rPr>
+              <a:t>AWS Config</a:t>
+            </a:r>
+            <a:endParaRPr b="0" lang="en-US" sz="1050" spc="-1" strike="noStrike">
+              <a:latin typeface="Arial"/>
+            </a:endParaRPr>
+          </a:p>
+        </p:txBody>
+      </p:sp>
+      <p:sp>
+        <p:nvSpPr>
+          <p:cNvPr id="50" name="CustomShape 13"/>
           <p:cNvSpPr/>
           <p:nvPr/>
         </p:nvSpPr>
         <p:spPr>
           <a:xfrm rot="5336400">
-            <a:off x="7357320" y="3037680"/>
-            <a:ext cx="665280" cy="5760"/>
+            <a:off x="7357680" y="3037320"/>
+            <a:ext cx="664920" cy="5400"/>
           </a:xfrm>
           <a:prstGeom prst="bentConnector3">
             <a:avLst>

</xml_diff>